<commit_message>
Updated architecture and settings files
</commit_message>
<xml_diff>
--- a/docs/images/rancher-architecture-diagram.pptx
+++ b/docs/images/rancher-architecture-diagram.pptx
@@ -243,7 +243,7 @@
           <a:p>
             <a:fld id="{6244D3B9-4146-964F-9E7E-473F62F24AD4}" type="datetimeFigureOut">
               <a:rPr lang="en-US" smtClean="0"/>
-              <a:t>1/30/2021</a:t>
+              <a:t>2/4/2021</a:t>
             </a:fld>
             <a:endParaRPr lang="en-US"/>
           </a:p>
@@ -413,7 +413,7 @@
           <a:p>
             <a:fld id="{6244D3B9-4146-964F-9E7E-473F62F24AD4}" type="datetimeFigureOut">
               <a:rPr lang="en-US" smtClean="0"/>
-              <a:t>1/30/2021</a:t>
+              <a:t>2/4/2021</a:t>
             </a:fld>
             <a:endParaRPr lang="en-US"/>
           </a:p>
@@ -593,7 +593,7 @@
           <a:p>
             <a:fld id="{6244D3B9-4146-964F-9E7E-473F62F24AD4}" type="datetimeFigureOut">
               <a:rPr lang="en-US" smtClean="0"/>
-              <a:t>1/30/2021</a:t>
+              <a:t>2/4/2021</a:t>
             </a:fld>
             <a:endParaRPr lang="en-US"/>
           </a:p>
@@ -763,7 +763,7 @@
           <a:p>
             <a:fld id="{6244D3B9-4146-964F-9E7E-473F62F24AD4}" type="datetimeFigureOut">
               <a:rPr lang="en-US" smtClean="0"/>
-              <a:t>1/30/2021</a:t>
+              <a:t>2/4/2021</a:t>
             </a:fld>
             <a:endParaRPr lang="en-US"/>
           </a:p>
@@ -1009,7 +1009,7 @@
           <a:p>
             <a:fld id="{6244D3B9-4146-964F-9E7E-473F62F24AD4}" type="datetimeFigureOut">
               <a:rPr lang="en-US" smtClean="0"/>
-              <a:t>1/30/2021</a:t>
+              <a:t>2/4/2021</a:t>
             </a:fld>
             <a:endParaRPr lang="en-US"/>
           </a:p>
@@ -1241,7 +1241,7 @@
           <a:p>
             <a:fld id="{6244D3B9-4146-964F-9E7E-473F62F24AD4}" type="datetimeFigureOut">
               <a:rPr lang="en-US" smtClean="0"/>
-              <a:t>1/30/2021</a:t>
+              <a:t>2/4/2021</a:t>
             </a:fld>
             <a:endParaRPr lang="en-US"/>
           </a:p>
@@ -1608,7 +1608,7 @@
           <a:p>
             <a:fld id="{6244D3B9-4146-964F-9E7E-473F62F24AD4}" type="datetimeFigureOut">
               <a:rPr lang="en-US" smtClean="0"/>
-              <a:t>1/30/2021</a:t>
+              <a:t>2/4/2021</a:t>
             </a:fld>
             <a:endParaRPr lang="en-US"/>
           </a:p>
@@ -1726,7 +1726,7 @@
           <a:p>
             <a:fld id="{6244D3B9-4146-964F-9E7E-473F62F24AD4}" type="datetimeFigureOut">
               <a:rPr lang="en-US" smtClean="0"/>
-              <a:t>1/30/2021</a:t>
+              <a:t>2/4/2021</a:t>
             </a:fld>
             <a:endParaRPr lang="en-US"/>
           </a:p>
@@ -1821,7 +1821,7 @@
           <a:p>
             <a:fld id="{6244D3B9-4146-964F-9E7E-473F62F24AD4}" type="datetimeFigureOut">
               <a:rPr lang="en-US" smtClean="0"/>
-              <a:t>1/30/2021</a:t>
+              <a:t>2/4/2021</a:t>
             </a:fld>
             <a:endParaRPr lang="en-US"/>
           </a:p>
@@ -2098,7 +2098,7 @@
           <a:p>
             <a:fld id="{6244D3B9-4146-964F-9E7E-473F62F24AD4}" type="datetimeFigureOut">
               <a:rPr lang="en-US" smtClean="0"/>
-              <a:t>1/30/2021</a:t>
+              <a:t>2/4/2021</a:t>
             </a:fld>
             <a:endParaRPr lang="en-US"/>
           </a:p>
@@ -2355,7 +2355,7 @@
           <a:p>
             <a:fld id="{6244D3B9-4146-964F-9E7E-473F62F24AD4}" type="datetimeFigureOut">
               <a:rPr lang="en-US" smtClean="0"/>
-              <a:t>1/30/2021</a:t>
+              <a:t>2/4/2021</a:t>
             </a:fld>
             <a:endParaRPr lang="en-US"/>
           </a:p>
@@ -2568,7 +2568,7 @@
           <a:p>
             <a:fld id="{6244D3B9-4146-964F-9E7E-473F62F24AD4}" type="datetimeFigureOut">
               <a:rPr lang="en-US" smtClean="0"/>
-              <a:t>1/30/2021</a:t>
+              <a:t>2/4/2021</a:t>
             </a:fld>
             <a:endParaRPr lang="en-US"/>
           </a:p>
@@ -3778,7 +3778,7 @@
           <a:blip r:embed="rId2">
             <a:extLst>
               <a:ext uri="{96DAC541-7B7A-43D3-8B79-37D633B846F1}">
-                <asvg:svgBlip xmlns="" xmlns:asvg="http://schemas.microsoft.com/office/drawing/2016/SVG/main" r:embed="rId8"/>
+                <asvg:svgBlip xmlns:asvg="http://schemas.microsoft.com/office/drawing/2016/SVG/main" xmlns="" r:embed="rId8"/>
               </a:ext>
             </a:extLst>
           </a:blip>
@@ -3814,7 +3814,7 @@
           <a:blip r:embed="rId9">
             <a:extLst>
               <a:ext uri="{96DAC541-7B7A-43D3-8B79-37D633B846F1}">
-                <asvg:svgBlip xmlns="" xmlns:asvg="http://schemas.microsoft.com/office/drawing/2016/SVG/main" r:embed="rId10"/>
+                <asvg:svgBlip xmlns:asvg="http://schemas.microsoft.com/office/drawing/2016/SVG/main" xmlns="" r:embed="rId10"/>
               </a:ext>
             </a:extLst>
           </a:blip>
@@ -5178,7 +5178,7 @@
         <p:spPr bwMode="auto">
           <a:xfrm>
             <a:off x="9374744" y="5013305"/>
-            <a:ext cx="1945325" cy="523875"/>
+            <a:ext cx="1945325" cy="307777"/>
           </a:xfrm>
           <a:prstGeom prst="rect">
             <a:avLst/>
@@ -5312,24 +5312,26 @@
           <a:p>
             <a:pPr algn="ctr" eaLnBrk="1" hangingPunct="1"/>
             <a:r>
-              <a:rPr lang="en-US" altLang="en-US" sz="1400" dirty="0">
+              <a:rPr lang="en-US" altLang="en-US" sz="1400">
                 <a:latin typeface="Arial" panose="020B0604020202020204" pitchFamily="34" charset="0"/>
                 <a:ea typeface="Amazon Ember" panose="020B0603020204020204" pitchFamily="34" charset="0"/>
                 <a:cs typeface="Arial" panose="020B0604020202020204" pitchFamily="34" charset="0"/>
               </a:rPr>
-              <a:t>Amazon Elastic</a:t>
-            </a:r>
-          </a:p>
-          <a:p>
-            <a:pPr algn="ctr" eaLnBrk="1" hangingPunct="1"/>
-            <a:r>
-              <a:rPr lang="en-US" altLang="en-US" sz="1400" dirty="0">
+              <a:t>Amazon </a:t>
+            </a:r>
+            <a:r>
+              <a:rPr lang="en-US" altLang="en-US" sz="1400" smtClean="0">
                 <a:latin typeface="Arial" panose="020B0604020202020204" pitchFamily="34" charset="0"/>
                 <a:ea typeface="Amazon Ember" panose="020B0603020204020204" pitchFamily="34" charset="0"/>
                 <a:cs typeface="Arial" panose="020B0604020202020204" pitchFamily="34" charset="0"/>
               </a:rPr>
-              <a:t>Container Kubernetes</a:t>
-            </a:r>
+              <a:t>EKS</a:t>
+            </a:r>
+            <a:endParaRPr lang="en-US" altLang="en-US" sz="1400" dirty="0">
+              <a:latin typeface="Arial" panose="020B0604020202020204" pitchFamily="34" charset="0"/>
+              <a:ea typeface="Amazon Ember" panose="020B0603020204020204" pitchFamily="34" charset="0"/>
+              <a:cs typeface="Arial" panose="020B0604020202020204" pitchFamily="34" charset="0"/>
+            </a:endParaRPr>
           </a:p>
         </p:txBody>
       </p:sp>

</xml_diff>